<commit_message>
added keyboard navigation images
</commit_message>
<xml_diff>
--- a/images/navigation.pptx
+++ b/images/navigation.pptx
@@ -5,7 +5,9 @@
     <p:sldMasterId id="2147483648" r:id="rId1"/>
   </p:sldMasterIdLst>
   <p:sldIdLst>
-    <p:sldId id="256" r:id="rId2"/>
+    <p:sldId id="257" r:id="rId2"/>
+    <p:sldId id="258" r:id="rId3"/>
+    <p:sldId id="259" r:id="rId4"/>
   </p:sldIdLst>
   <p:sldSz cx="12192000" cy="6858000"/>
   <p:notesSz cx="6858000" cy="9144000"/>
@@ -104,6 +106,11 @@
       </a:defRPr>
     </a:lvl9pPr>
   </p:defaultTextStyle>
+  <p:extLst>
+    <p:ext uri="{EFAFB233-063F-42B5-8137-9DF3F51BA10A}">
+      <p15:sldGuideLst xmlns:p15="http://schemas.microsoft.com/office/powerpoint/2012/main"/>
+    </p:ext>
+  </p:extLst>
 </p:presentation>
 </file>
 
@@ -3323,7 +3330,7 @@
       </p:grpSpPr>
       <p:pic>
         <p:nvPicPr>
-          <p:cNvPr id="5" name="Picture 4" descr="A picture containing keyboard, electronics, computer, close&#10;&#10;Description automatically generated">
+          <p:cNvPr id="5" name="Picture 4">
             <a:extLst>
               <a:ext uri="{FF2B5EF4-FFF2-40B4-BE49-F238E27FC236}">
                 <a16:creationId xmlns:a16="http://schemas.microsoft.com/office/drawing/2014/main" id="{2F3E85AA-F758-8042-80DC-F594AE577669}"/>
@@ -3337,14 +3344,13 @@
         </p:nvPicPr>
         <p:blipFill>
           <a:blip r:embed="rId2"/>
-          <a:stretch>
-            <a:fillRect/>
-          </a:stretch>
+          <a:srcRect/>
+          <a:stretch/>
         </p:blipFill>
         <p:spPr>
           <a:xfrm>
-            <a:off x="2286000" y="2019300"/>
-            <a:ext cx="7620000" cy="2819400"/>
+            <a:off x="2286000" y="2169160"/>
+            <a:ext cx="7620000" cy="2519680"/>
           </a:xfrm>
           <a:prstGeom prst="rect">
             <a:avLst/>
@@ -3353,10 +3359,10 @@
       </p:pic>
       <p:sp>
         <p:nvSpPr>
-          <p:cNvPr id="6" name="Rectangle 5">
-            <a:extLst>
-              <a:ext uri="{FF2B5EF4-FFF2-40B4-BE49-F238E27FC236}">
-                <a16:creationId xmlns:a16="http://schemas.microsoft.com/office/drawing/2014/main" id="{D5D098A0-FC29-9B49-A9FF-0690DE3F94F9}"/>
+          <p:cNvPr id="8" name="Rectangle 7">
+            <a:extLst>
+              <a:ext uri="{FF2B5EF4-FFF2-40B4-BE49-F238E27FC236}">
+                <a16:creationId xmlns:a16="http://schemas.microsoft.com/office/drawing/2014/main" id="{CD2E4FC8-7567-A740-A38E-59B53146BA3E}"/>
               </a:ext>
             </a:extLst>
           </p:cNvPr>
@@ -3365,8 +3371,8 @@
         </p:nvSpPr>
         <p:spPr>
           <a:xfrm>
-            <a:off x="4786610" y="3095580"/>
-            <a:ext cx="1149179" cy="1037968"/>
+            <a:off x="7240776" y="3720187"/>
+            <a:ext cx="1149179" cy="820282"/>
           </a:xfrm>
           <a:prstGeom prst="rect">
             <a:avLst/>
@@ -3403,6 +3409,65 @@
           </a:p>
         </p:txBody>
       </p:sp>
+    </p:spTree>
+    <p:extLst>
+      <p:ext uri="{BB962C8B-B14F-4D97-AF65-F5344CB8AC3E}">
+        <p14:creationId xmlns:p14="http://schemas.microsoft.com/office/powerpoint/2010/main" val="2974233727"/>
+      </p:ext>
+    </p:extLst>
+  </p:cSld>
+  <p:clrMapOvr>
+    <a:masterClrMapping/>
+  </p:clrMapOvr>
+</p:sld>
+</file>
+
+<file path=ppt/slides/slide2.xml><?xml version="1.0" encoding="utf-8"?>
+<p:sld xmlns:a="http://schemas.openxmlformats.org/drawingml/2006/main" xmlns:r="http://schemas.openxmlformats.org/officeDocument/2006/relationships" xmlns:p="http://schemas.openxmlformats.org/presentationml/2006/main">
+  <p:cSld>
+    <p:spTree>
+      <p:nvGrpSpPr>
+        <p:cNvPr id="1" name=""/>
+        <p:cNvGrpSpPr/>
+        <p:nvPr/>
+      </p:nvGrpSpPr>
+      <p:grpSpPr>
+        <a:xfrm>
+          <a:off x="0" y="0"/>
+          <a:ext cx="0" cy="0"/>
+          <a:chOff x="0" y="0"/>
+          <a:chExt cx="0" cy="0"/>
+        </a:xfrm>
+      </p:grpSpPr>
+      <p:pic>
+        <p:nvPicPr>
+          <p:cNvPr id="5" name="Picture 4">
+            <a:extLst>
+              <a:ext uri="{FF2B5EF4-FFF2-40B4-BE49-F238E27FC236}">
+                <a16:creationId xmlns:a16="http://schemas.microsoft.com/office/drawing/2014/main" id="{2F3E85AA-F758-8042-80DC-F594AE577669}"/>
+              </a:ext>
+            </a:extLst>
+          </p:cNvPr>
+          <p:cNvPicPr>
+            <a:picLocks noChangeAspect="1"/>
+          </p:cNvPicPr>
+          <p:nvPr/>
+        </p:nvPicPr>
+        <p:blipFill>
+          <a:blip r:embed="rId2"/>
+          <a:srcRect/>
+          <a:stretch/>
+        </p:blipFill>
+        <p:spPr>
+          <a:xfrm>
+            <a:off x="2286000" y="2169160"/>
+            <a:ext cx="7620000" cy="2519680"/>
+          </a:xfrm>
+          <a:prstGeom prst="rect">
+            <a:avLst/>
+          </a:prstGeom>
+        </p:spPr>
+      </p:pic>
       <p:sp>
         <p:nvSpPr>
           <p:cNvPr id="7" name="Up Arrow 6">
@@ -3458,10 +3523,774 @@
           </a:p>
         </p:txBody>
       </p:sp>
+      <p:sp>
+        <p:nvSpPr>
+          <p:cNvPr id="8" name="Rectangle 7">
+            <a:extLst>
+              <a:ext uri="{FF2B5EF4-FFF2-40B4-BE49-F238E27FC236}">
+                <a16:creationId xmlns:a16="http://schemas.microsoft.com/office/drawing/2014/main" id="{CD2E4FC8-7567-A740-A38E-59B53146BA3E}"/>
+              </a:ext>
+            </a:extLst>
+          </p:cNvPr>
+          <p:cNvSpPr/>
+          <p:nvPr/>
+        </p:nvSpPr>
+        <p:spPr>
+          <a:xfrm>
+            <a:off x="7240776" y="3720187"/>
+            <a:ext cx="1149179" cy="820282"/>
+          </a:xfrm>
+          <a:prstGeom prst="rect">
+            <a:avLst/>
+          </a:prstGeom>
+          <a:noFill/>
+          <a:ln w="76200">
+            <a:solidFill>
+              <a:srgbClr val="51EA00"/>
+            </a:solidFill>
+          </a:ln>
+        </p:spPr>
+        <p:style>
+          <a:lnRef idx="2">
+            <a:schemeClr val="accent1">
+              <a:shade val="50000"/>
+            </a:schemeClr>
+          </a:lnRef>
+          <a:fillRef idx="1">
+            <a:schemeClr val="accent1"/>
+          </a:fillRef>
+          <a:effectRef idx="0">
+            <a:schemeClr val="accent1"/>
+          </a:effectRef>
+          <a:fontRef idx="minor">
+            <a:schemeClr val="lt1"/>
+          </a:fontRef>
+        </p:style>
+        <p:txBody>
+          <a:bodyPr rtlCol="0" anchor="ctr"/>
+          <a:lstStyle/>
+          <a:p>
+            <a:pPr algn="ctr"/>
+            <a:endParaRPr lang="en-US"/>
+          </a:p>
+        </p:txBody>
+      </p:sp>
+      <p:sp>
+        <p:nvSpPr>
+          <p:cNvPr id="9" name="Rectangle 8">
+            <a:extLst>
+              <a:ext uri="{FF2B5EF4-FFF2-40B4-BE49-F238E27FC236}">
+                <a16:creationId xmlns:a16="http://schemas.microsoft.com/office/drawing/2014/main" id="{FD9C3503-3251-F645-A9F9-F4A697352641}"/>
+              </a:ext>
+            </a:extLst>
+          </p:cNvPr>
+          <p:cNvSpPr/>
+          <p:nvPr/>
+        </p:nvSpPr>
+        <p:spPr>
+          <a:xfrm>
+            <a:off x="4863646" y="3064565"/>
+            <a:ext cx="1149179" cy="820282"/>
+          </a:xfrm>
+          <a:prstGeom prst="rect">
+            <a:avLst/>
+          </a:prstGeom>
+          <a:noFill/>
+          <a:ln w="76200">
+            <a:solidFill>
+              <a:srgbClr val="51EA00"/>
+            </a:solidFill>
+          </a:ln>
+        </p:spPr>
+        <p:style>
+          <a:lnRef idx="2">
+            <a:schemeClr val="accent1">
+              <a:shade val="50000"/>
+            </a:schemeClr>
+          </a:lnRef>
+          <a:fillRef idx="1">
+            <a:schemeClr val="accent1"/>
+          </a:fillRef>
+          <a:effectRef idx="0">
+            <a:schemeClr val="accent1"/>
+          </a:effectRef>
+          <a:fontRef idx="minor">
+            <a:schemeClr val="lt1"/>
+          </a:fontRef>
+        </p:style>
+        <p:txBody>
+          <a:bodyPr rtlCol="0" anchor="ctr"/>
+          <a:lstStyle/>
+          <a:p>
+            <a:pPr algn="ctr"/>
+            <a:endParaRPr lang="en-US"/>
+          </a:p>
+        </p:txBody>
+      </p:sp>
     </p:spTree>
     <p:extLst>
       <p:ext uri="{BB962C8B-B14F-4D97-AF65-F5344CB8AC3E}">
-        <p14:creationId xmlns:p14="http://schemas.microsoft.com/office/powerpoint/2010/main" val="3410302457"/>
+        <p14:creationId xmlns:p14="http://schemas.microsoft.com/office/powerpoint/2010/main" val="2584673923"/>
+      </p:ext>
+    </p:extLst>
+  </p:cSld>
+  <p:clrMapOvr>
+    <a:masterClrMapping/>
+  </p:clrMapOvr>
+</p:sld>
+</file>
+
+<file path=ppt/slides/slide3.xml><?xml version="1.0" encoding="utf-8"?>
+<p:sld xmlns:a="http://schemas.openxmlformats.org/drawingml/2006/main" xmlns:r="http://schemas.openxmlformats.org/officeDocument/2006/relationships" xmlns:p="http://schemas.openxmlformats.org/presentationml/2006/main">
+  <p:cSld>
+    <p:spTree>
+      <p:nvGrpSpPr>
+        <p:cNvPr id="1" name=""/>
+        <p:cNvGrpSpPr/>
+        <p:nvPr/>
+      </p:nvGrpSpPr>
+      <p:grpSpPr>
+        <a:xfrm>
+          <a:off x="0" y="0"/>
+          <a:ext cx="0" cy="0"/>
+          <a:chOff x="0" y="0"/>
+          <a:chExt cx="0" cy="0"/>
+        </a:xfrm>
+      </p:grpSpPr>
+      <p:pic>
+        <p:nvPicPr>
+          <p:cNvPr id="5" name="Picture 4">
+            <a:extLst>
+              <a:ext uri="{FF2B5EF4-FFF2-40B4-BE49-F238E27FC236}">
+                <a16:creationId xmlns:a16="http://schemas.microsoft.com/office/drawing/2014/main" id="{2F3E85AA-F758-8042-80DC-F594AE577669}"/>
+              </a:ext>
+            </a:extLst>
+          </p:cNvPr>
+          <p:cNvPicPr>
+            <a:picLocks noChangeAspect="1"/>
+          </p:cNvPicPr>
+          <p:nvPr/>
+        </p:nvPicPr>
+        <p:blipFill>
+          <a:blip r:embed="rId2"/>
+          <a:srcRect/>
+          <a:stretch/>
+        </p:blipFill>
+        <p:spPr>
+          <a:xfrm>
+            <a:off x="2286000" y="2169160"/>
+            <a:ext cx="7620000" cy="2519680"/>
+          </a:xfrm>
+          <a:prstGeom prst="rect">
+            <a:avLst/>
+          </a:prstGeom>
+        </p:spPr>
+      </p:pic>
+      <p:sp>
+        <p:nvSpPr>
+          <p:cNvPr id="13" name="Rectangle 12">
+            <a:extLst>
+              <a:ext uri="{FF2B5EF4-FFF2-40B4-BE49-F238E27FC236}">
+                <a16:creationId xmlns:a16="http://schemas.microsoft.com/office/drawing/2014/main" id="{B6CADD78-23C9-8349-AC64-B8A1276F5BB4}"/>
+              </a:ext>
+            </a:extLst>
+          </p:cNvPr>
+          <p:cNvSpPr/>
+          <p:nvPr/>
+        </p:nvSpPr>
+        <p:spPr>
+          <a:xfrm>
+            <a:off x="2566417" y="3474706"/>
+            <a:ext cx="359663" cy="236916"/>
+          </a:xfrm>
+          <a:prstGeom prst="rect">
+            <a:avLst/>
+          </a:prstGeom>
+          <a:noFill/>
+          <a:ln w="76200">
+            <a:solidFill>
+              <a:srgbClr val="51EA00"/>
+            </a:solidFill>
+          </a:ln>
+        </p:spPr>
+        <p:style>
+          <a:lnRef idx="2">
+            <a:schemeClr val="accent1">
+              <a:shade val="50000"/>
+            </a:schemeClr>
+          </a:lnRef>
+          <a:fillRef idx="1">
+            <a:schemeClr val="accent1"/>
+          </a:fillRef>
+          <a:effectRef idx="0">
+            <a:schemeClr val="accent1"/>
+          </a:effectRef>
+          <a:fontRef idx="minor">
+            <a:schemeClr val="lt1"/>
+          </a:fontRef>
+        </p:style>
+        <p:txBody>
+          <a:bodyPr rtlCol="0" anchor="ctr"/>
+          <a:lstStyle/>
+          <a:p>
+            <a:pPr algn="ctr"/>
+            <a:endParaRPr lang="en-US"/>
+          </a:p>
+        </p:txBody>
+      </p:sp>
+      <p:sp>
+        <p:nvSpPr>
+          <p:cNvPr id="14" name="TextBox 13">
+            <a:extLst>
+              <a:ext uri="{FF2B5EF4-FFF2-40B4-BE49-F238E27FC236}">
+                <a16:creationId xmlns:a16="http://schemas.microsoft.com/office/drawing/2014/main" id="{BACF51F0-BAF4-4B4A-A19F-3E02FDAA1158}"/>
+              </a:ext>
+            </a:extLst>
+          </p:cNvPr>
+          <p:cNvSpPr txBox="1"/>
+          <p:nvPr/>
+        </p:nvSpPr>
+        <p:spPr>
+          <a:xfrm>
+            <a:off x="3339376" y="3499680"/>
+            <a:ext cx="343230" cy="215444"/>
+          </a:xfrm>
+          <a:prstGeom prst="rect">
+            <a:avLst/>
+          </a:prstGeom>
+          <a:solidFill>
+            <a:schemeClr val="tx1"/>
+          </a:solidFill>
+        </p:spPr>
+        <p:txBody>
+          <a:bodyPr wrap="square" lIns="0" tIns="0" rIns="0" bIns="0" rtlCol="0">
+            <a:spAutoFit/>
+          </a:bodyPr>
+          <a:lstStyle/>
+          <a:p>
+            <a:r>
+              <a:rPr lang="en-US" sz="1400" dirty="0">
+                <a:solidFill>
+                  <a:srgbClr val="51EA00"/>
+                </a:solidFill>
+              </a:rPr>
+              <a:t>⌘</a:t>
+            </a:r>
+            <a:r>
+              <a:rPr lang="en-US" sz="1400" b="1" dirty="0">
+                <a:solidFill>
+                  <a:srgbClr val="51EA00"/>
+                </a:solidFill>
+                <a:latin typeface="Arial" panose="020B0604020202020204" pitchFamily="34" charset="0"/>
+                <a:cs typeface="Arial" panose="020B0604020202020204" pitchFamily="34" charset="0"/>
+              </a:rPr>
+              <a:t>X</a:t>
+            </a:r>
+          </a:p>
+        </p:txBody>
+      </p:sp>
+      <p:sp>
+        <p:nvSpPr>
+          <p:cNvPr id="15" name="TextBox 14">
+            <a:extLst>
+              <a:ext uri="{FF2B5EF4-FFF2-40B4-BE49-F238E27FC236}">
+                <a16:creationId xmlns:a16="http://schemas.microsoft.com/office/drawing/2014/main" id="{53F6D007-B809-454D-AE54-2CD51555B624}"/>
+              </a:ext>
+            </a:extLst>
+          </p:cNvPr>
+          <p:cNvSpPr txBox="1"/>
+          <p:nvPr/>
+        </p:nvSpPr>
+        <p:spPr>
+          <a:xfrm>
+            <a:off x="3696456" y="3499680"/>
+            <a:ext cx="337098" cy="215444"/>
+          </a:xfrm>
+          <a:prstGeom prst="rect">
+            <a:avLst/>
+          </a:prstGeom>
+          <a:solidFill>
+            <a:schemeClr val="tx1"/>
+          </a:solidFill>
+        </p:spPr>
+        <p:txBody>
+          <a:bodyPr wrap="square" lIns="0" tIns="0" rIns="0" bIns="0" rtlCol="0">
+            <a:spAutoFit/>
+          </a:bodyPr>
+          <a:lstStyle/>
+          <a:p>
+            <a:r>
+              <a:rPr lang="en-US" sz="1400" dirty="0">
+                <a:solidFill>
+                  <a:srgbClr val="51EA00"/>
+                </a:solidFill>
+              </a:rPr>
+              <a:t>⌘</a:t>
+            </a:r>
+            <a:r>
+              <a:rPr lang="en-US" sz="1400" b="1" dirty="0">
+                <a:solidFill>
+                  <a:srgbClr val="51EA00"/>
+                </a:solidFill>
+              </a:rPr>
+              <a:t>C</a:t>
+            </a:r>
+            <a:endParaRPr lang="en-US" sz="1400" b="1" dirty="0">
+              <a:solidFill>
+                <a:srgbClr val="51EA00"/>
+              </a:solidFill>
+              <a:latin typeface="Arial" panose="020B0604020202020204" pitchFamily="34" charset="0"/>
+              <a:cs typeface="Arial" panose="020B0604020202020204" pitchFamily="34" charset="0"/>
+            </a:endParaRPr>
+          </a:p>
+        </p:txBody>
+      </p:sp>
+      <p:sp>
+        <p:nvSpPr>
+          <p:cNvPr id="16" name="TextBox 15">
+            <a:extLst>
+              <a:ext uri="{FF2B5EF4-FFF2-40B4-BE49-F238E27FC236}">
+                <a16:creationId xmlns:a16="http://schemas.microsoft.com/office/drawing/2014/main" id="{FEE9BE6A-6FE4-6E4F-BEBC-275CD217EDE2}"/>
+              </a:ext>
+            </a:extLst>
+          </p:cNvPr>
+          <p:cNvSpPr txBox="1"/>
+          <p:nvPr/>
+        </p:nvSpPr>
+        <p:spPr>
+          <a:xfrm>
+            <a:off x="4033554" y="3499680"/>
+            <a:ext cx="343230" cy="215444"/>
+          </a:xfrm>
+          <a:prstGeom prst="rect">
+            <a:avLst/>
+          </a:prstGeom>
+          <a:solidFill>
+            <a:schemeClr val="tx1"/>
+          </a:solidFill>
+        </p:spPr>
+        <p:txBody>
+          <a:bodyPr wrap="square" lIns="0" tIns="0" rIns="0" bIns="0" rtlCol="0">
+            <a:spAutoFit/>
+          </a:bodyPr>
+          <a:lstStyle/>
+          <a:p>
+            <a:r>
+              <a:rPr lang="en-US" sz="1400" dirty="0">
+                <a:solidFill>
+                  <a:srgbClr val="51EA00"/>
+                </a:solidFill>
+              </a:rPr>
+              <a:t>⌘</a:t>
+            </a:r>
+            <a:r>
+              <a:rPr lang="en-US" sz="1400" b="1" dirty="0">
+                <a:solidFill>
+                  <a:srgbClr val="51EA00"/>
+                </a:solidFill>
+              </a:rPr>
+              <a:t>V</a:t>
+            </a:r>
+            <a:endParaRPr lang="en-US" sz="1400" b="1" dirty="0">
+              <a:solidFill>
+                <a:srgbClr val="51EA00"/>
+              </a:solidFill>
+              <a:latin typeface="Arial" panose="020B0604020202020204" pitchFamily="34" charset="0"/>
+              <a:cs typeface="Arial" panose="020B0604020202020204" pitchFamily="34" charset="0"/>
+            </a:endParaRPr>
+          </a:p>
+        </p:txBody>
+      </p:sp>
+      <p:sp>
+        <p:nvSpPr>
+          <p:cNvPr id="17" name="TextBox 16">
+            <a:extLst>
+              <a:ext uri="{FF2B5EF4-FFF2-40B4-BE49-F238E27FC236}">
+                <a16:creationId xmlns:a16="http://schemas.microsoft.com/office/drawing/2014/main" id="{B10328B7-4B7A-6A49-81EC-3A4E63CC1E4A}"/>
+              </a:ext>
+            </a:extLst>
+          </p:cNvPr>
+          <p:cNvSpPr txBox="1"/>
+          <p:nvPr/>
+        </p:nvSpPr>
+        <p:spPr>
+          <a:xfrm>
+            <a:off x="5262150" y="3188081"/>
+            <a:ext cx="229063" cy="276999"/>
+          </a:xfrm>
+          <a:prstGeom prst="rect">
+            <a:avLst/>
+          </a:prstGeom>
+          <a:solidFill>
+            <a:schemeClr val="tx1"/>
+          </a:solidFill>
+        </p:spPr>
+        <p:txBody>
+          <a:bodyPr wrap="square" lIns="0" tIns="0" rIns="0" bIns="0" rtlCol="0">
+            <a:spAutoFit/>
+          </a:bodyPr>
+          <a:lstStyle/>
+          <a:p>
+            <a:pPr algn="ctr"/>
+            <a:r>
+              <a:rPr lang="en-US" b="1" dirty="0">
+                <a:solidFill>
+                  <a:srgbClr val="51EA00"/>
+                </a:solidFill>
+              </a:rPr>
+              <a:t>↑</a:t>
+            </a:r>
+            <a:endParaRPr lang="en-US" sz="1100" b="1" dirty="0">
+              <a:solidFill>
+                <a:srgbClr val="51EA00"/>
+              </a:solidFill>
+              <a:latin typeface="Arial" panose="020B0604020202020204" pitchFamily="34" charset="0"/>
+              <a:cs typeface="Arial" panose="020B0604020202020204" pitchFamily="34" charset="0"/>
+            </a:endParaRPr>
+          </a:p>
+        </p:txBody>
+      </p:sp>
+      <p:sp>
+        <p:nvSpPr>
+          <p:cNvPr id="18" name="TextBox 17">
+            <a:extLst>
+              <a:ext uri="{FF2B5EF4-FFF2-40B4-BE49-F238E27FC236}">
+                <a16:creationId xmlns:a16="http://schemas.microsoft.com/office/drawing/2014/main" id="{91C8DD8C-76C4-C041-B50A-6173BF2C8C27}"/>
+              </a:ext>
+            </a:extLst>
+          </p:cNvPr>
+          <p:cNvSpPr txBox="1"/>
+          <p:nvPr/>
+        </p:nvSpPr>
+        <p:spPr>
+          <a:xfrm rot="10800000">
+            <a:off x="5313484" y="3465596"/>
+            <a:ext cx="229063" cy="276999"/>
+          </a:xfrm>
+          <a:prstGeom prst="rect">
+            <a:avLst/>
+          </a:prstGeom>
+          <a:solidFill>
+            <a:schemeClr val="tx1"/>
+          </a:solidFill>
+        </p:spPr>
+        <p:txBody>
+          <a:bodyPr wrap="square" lIns="0" tIns="0" rIns="0" bIns="0" rtlCol="0">
+            <a:spAutoFit/>
+          </a:bodyPr>
+          <a:lstStyle/>
+          <a:p>
+            <a:pPr algn="ctr"/>
+            <a:r>
+              <a:rPr lang="en-US" b="1" dirty="0">
+                <a:solidFill>
+                  <a:srgbClr val="51EA00"/>
+                </a:solidFill>
+              </a:rPr>
+              <a:t>↑</a:t>
+            </a:r>
+            <a:endParaRPr lang="en-US" sz="1100" b="1" dirty="0">
+              <a:solidFill>
+                <a:srgbClr val="51EA00"/>
+              </a:solidFill>
+              <a:latin typeface="Arial" panose="020B0604020202020204" pitchFamily="34" charset="0"/>
+              <a:cs typeface="Arial" panose="020B0604020202020204" pitchFamily="34" charset="0"/>
+            </a:endParaRPr>
+          </a:p>
+        </p:txBody>
+      </p:sp>
+      <p:sp>
+        <p:nvSpPr>
+          <p:cNvPr id="19" name="TextBox 18">
+            <a:extLst>
+              <a:ext uri="{FF2B5EF4-FFF2-40B4-BE49-F238E27FC236}">
+                <a16:creationId xmlns:a16="http://schemas.microsoft.com/office/drawing/2014/main" id="{77BA98B0-13D6-7040-B513-3C63F5877838}"/>
+              </a:ext>
+            </a:extLst>
+          </p:cNvPr>
+          <p:cNvSpPr txBox="1"/>
+          <p:nvPr/>
+        </p:nvSpPr>
+        <p:spPr>
+          <a:xfrm rot="5400000">
+            <a:off x="5617849" y="3465596"/>
+            <a:ext cx="229063" cy="276999"/>
+          </a:xfrm>
+          <a:prstGeom prst="rect">
+            <a:avLst/>
+          </a:prstGeom>
+          <a:solidFill>
+            <a:schemeClr val="tx1"/>
+          </a:solidFill>
+        </p:spPr>
+        <p:txBody>
+          <a:bodyPr wrap="square" lIns="0" tIns="0" rIns="0" bIns="0" rtlCol="0">
+            <a:spAutoFit/>
+          </a:bodyPr>
+          <a:lstStyle/>
+          <a:p>
+            <a:pPr algn="ctr"/>
+            <a:r>
+              <a:rPr lang="en-US" b="1" dirty="0">
+                <a:solidFill>
+                  <a:srgbClr val="51EA00"/>
+                </a:solidFill>
+              </a:rPr>
+              <a:t>↑</a:t>
+            </a:r>
+            <a:endParaRPr lang="en-US" sz="1100" b="1" dirty="0">
+              <a:solidFill>
+                <a:srgbClr val="51EA00"/>
+              </a:solidFill>
+              <a:latin typeface="Arial" panose="020B0604020202020204" pitchFamily="34" charset="0"/>
+              <a:cs typeface="Arial" panose="020B0604020202020204" pitchFamily="34" charset="0"/>
+            </a:endParaRPr>
+          </a:p>
+        </p:txBody>
+      </p:sp>
+      <p:sp>
+        <p:nvSpPr>
+          <p:cNvPr id="20" name="TextBox 19">
+            <a:extLst>
+              <a:ext uri="{FF2B5EF4-FFF2-40B4-BE49-F238E27FC236}">
+                <a16:creationId xmlns:a16="http://schemas.microsoft.com/office/drawing/2014/main" id="{E2CEDDF5-93B0-AD4C-92AE-EEBF4DCBA085}"/>
+              </a:ext>
+            </a:extLst>
+          </p:cNvPr>
+          <p:cNvSpPr txBox="1"/>
+          <p:nvPr/>
+        </p:nvSpPr>
+        <p:spPr>
+          <a:xfrm rot="16200000">
+            <a:off x="5010387" y="3469990"/>
+            <a:ext cx="229063" cy="276999"/>
+          </a:xfrm>
+          <a:prstGeom prst="rect">
+            <a:avLst/>
+          </a:prstGeom>
+          <a:solidFill>
+            <a:schemeClr val="tx1"/>
+          </a:solidFill>
+        </p:spPr>
+        <p:txBody>
+          <a:bodyPr wrap="square" lIns="0" tIns="0" rIns="0" bIns="0" rtlCol="0">
+            <a:spAutoFit/>
+          </a:bodyPr>
+          <a:lstStyle/>
+          <a:p>
+            <a:pPr algn="ctr"/>
+            <a:r>
+              <a:rPr lang="en-US" b="1" dirty="0">
+                <a:solidFill>
+                  <a:srgbClr val="51EA00"/>
+                </a:solidFill>
+              </a:rPr>
+              <a:t>↑</a:t>
+            </a:r>
+            <a:endParaRPr lang="en-US" sz="1100" b="1" dirty="0">
+              <a:solidFill>
+                <a:srgbClr val="51EA00"/>
+              </a:solidFill>
+              <a:latin typeface="Arial" panose="020B0604020202020204" pitchFamily="34" charset="0"/>
+              <a:cs typeface="Arial" panose="020B0604020202020204" pitchFamily="34" charset="0"/>
+            </a:endParaRPr>
+          </a:p>
+        </p:txBody>
+      </p:sp>
+      <p:sp>
+        <p:nvSpPr>
+          <p:cNvPr id="21" name="TextBox 20">
+            <a:extLst>
+              <a:ext uri="{FF2B5EF4-FFF2-40B4-BE49-F238E27FC236}">
+                <a16:creationId xmlns:a16="http://schemas.microsoft.com/office/drawing/2014/main" id="{DDE19E71-AA36-1D49-B714-15A3D32B7A3B}"/>
+              </a:ext>
+            </a:extLst>
+          </p:cNvPr>
+          <p:cNvSpPr txBox="1"/>
+          <p:nvPr/>
+        </p:nvSpPr>
+        <p:spPr>
+          <a:xfrm>
+            <a:off x="4829012" y="1779655"/>
+            <a:ext cx="1324402" cy="369332"/>
+          </a:xfrm>
+          <a:prstGeom prst="rect">
+            <a:avLst/>
+          </a:prstGeom>
+          <a:noFill/>
+        </p:spPr>
+        <p:txBody>
+          <a:bodyPr wrap="none" rtlCol="0">
+            <a:spAutoFit/>
+          </a:bodyPr>
+          <a:lstStyle/>
+          <a:p>
+            <a:r>
+              <a:rPr lang="en-US" b="1" dirty="0">
+                <a:solidFill>
+                  <a:srgbClr val="51EA00"/>
+                </a:solidFill>
+                <a:latin typeface="Fira Sans" panose="020B0503050000020004" pitchFamily="34" charset="0"/>
+              </a:rPr>
+              <a:t>Navigation</a:t>
+            </a:r>
+          </a:p>
+        </p:txBody>
+      </p:sp>
+      <p:sp>
+        <p:nvSpPr>
+          <p:cNvPr id="22" name="TextBox 21">
+            <a:extLst>
+              <a:ext uri="{FF2B5EF4-FFF2-40B4-BE49-F238E27FC236}">
+                <a16:creationId xmlns:a16="http://schemas.microsoft.com/office/drawing/2014/main" id="{78F7F7D5-56AC-6A40-8A39-8B0305870E53}"/>
+              </a:ext>
+            </a:extLst>
+          </p:cNvPr>
+          <p:cNvSpPr txBox="1"/>
+          <p:nvPr/>
+        </p:nvSpPr>
+        <p:spPr>
+          <a:xfrm>
+            <a:off x="2925484" y="1785390"/>
+            <a:ext cx="1879041" cy="369332"/>
+          </a:xfrm>
+          <a:prstGeom prst="rect">
+            <a:avLst/>
+          </a:prstGeom>
+          <a:noFill/>
+        </p:spPr>
+        <p:txBody>
+          <a:bodyPr wrap="none" rtlCol="0">
+            <a:spAutoFit/>
+          </a:bodyPr>
+          <a:lstStyle/>
+          <a:p>
+            <a:r>
+              <a:rPr lang="en-US" b="1" dirty="0">
+                <a:solidFill>
+                  <a:srgbClr val="51EA00"/>
+                </a:solidFill>
+                <a:latin typeface="Fira Sans" panose="020B0503050000020004" pitchFamily="34" charset="0"/>
+              </a:rPr>
+              <a:t>Cut, Copy, Paste</a:t>
+            </a:r>
+          </a:p>
+        </p:txBody>
+      </p:sp>
+      <p:sp>
+        <p:nvSpPr>
+          <p:cNvPr id="23" name="Up Arrow 22">
+            <a:extLst>
+              <a:ext uri="{FF2B5EF4-FFF2-40B4-BE49-F238E27FC236}">
+                <a16:creationId xmlns:a16="http://schemas.microsoft.com/office/drawing/2014/main" id="{4B60BB11-7A79-9D4A-9DF3-FE69E6A151EB}"/>
+              </a:ext>
+            </a:extLst>
+          </p:cNvPr>
+          <p:cNvSpPr/>
+          <p:nvPr/>
+        </p:nvSpPr>
+        <p:spPr>
+          <a:xfrm rot="10800000">
+            <a:off x="5206793" y="2163425"/>
+            <a:ext cx="335754" cy="842822"/>
+          </a:xfrm>
+          <a:prstGeom prst="upArrow">
+            <a:avLst>
+              <a:gd name="adj1" fmla="val 18539"/>
+              <a:gd name="adj2" fmla="val 60113"/>
+            </a:avLst>
+          </a:prstGeom>
+          <a:solidFill>
+            <a:srgbClr val="51EA00"/>
+          </a:solidFill>
+          <a:ln>
+            <a:noFill/>
+          </a:ln>
+        </p:spPr>
+        <p:style>
+          <a:lnRef idx="2">
+            <a:schemeClr val="accent1">
+              <a:shade val="50000"/>
+            </a:schemeClr>
+          </a:lnRef>
+          <a:fillRef idx="1">
+            <a:schemeClr val="accent1"/>
+          </a:fillRef>
+          <a:effectRef idx="0">
+            <a:schemeClr val="accent1"/>
+          </a:effectRef>
+          <a:fontRef idx="minor">
+            <a:schemeClr val="lt1"/>
+          </a:fontRef>
+        </p:style>
+        <p:txBody>
+          <a:bodyPr rtlCol="0" anchor="ctr"/>
+          <a:lstStyle/>
+          <a:p>
+            <a:pPr algn="ctr"/>
+            <a:endParaRPr lang="en-US"/>
+          </a:p>
+        </p:txBody>
+      </p:sp>
+      <p:sp>
+        <p:nvSpPr>
+          <p:cNvPr id="24" name="Up Arrow 23">
+            <a:extLst>
+              <a:ext uri="{FF2B5EF4-FFF2-40B4-BE49-F238E27FC236}">
+                <a16:creationId xmlns:a16="http://schemas.microsoft.com/office/drawing/2014/main" id="{C892CAF4-7E8F-EF49-9D01-3747BA527162}"/>
+              </a:ext>
+            </a:extLst>
+          </p:cNvPr>
+          <p:cNvSpPr/>
+          <p:nvPr/>
+        </p:nvSpPr>
+        <p:spPr>
+          <a:xfrm rot="10800000">
+            <a:off x="3682606" y="2169160"/>
+            <a:ext cx="335754" cy="1153598"/>
+          </a:xfrm>
+          <a:prstGeom prst="upArrow">
+            <a:avLst>
+              <a:gd name="adj1" fmla="val 18539"/>
+              <a:gd name="adj2" fmla="val 60113"/>
+            </a:avLst>
+          </a:prstGeom>
+          <a:solidFill>
+            <a:srgbClr val="51EA00"/>
+          </a:solidFill>
+          <a:ln>
+            <a:noFill/>
+          </a:ln>
+        </p:spPr>
+        <p:style>
+          <a:lnRef idx="2">
+            <a:schemeClr val="accent1">
+              <a:shade val="50000"/>
+            </a:schemeClr>
+          </a:lnRef>
+          <a:fillRef idx="1">
+            <a:schemeClr val="accent1"/>
+          </a:fillRef>
+          <a:effectRef idx="0">
+            <a:schemeClr val="accent1"/>
+          </a:effectRef>
+          <a:fontRef idx="minor">
+            <a:schemeClr val="lt1"/>
+          </a:fontRef>
+        </p:style>
+        <p:txBody>
+          <a:bodyPr rtlCol="0" anchor="ctr"/>
+          <a:lstStyle/>
+          <a:p>
+            <a:pPr algn="ctr"/>
+            <a:endParaRPr lang="en-US"/>
+          </a:p>
+        </p:txBody>
+      </p:sp>
+    </p:spTree>
+    <p:extLst>
+      <p:ext uri="{BB962C8B-B14F-4D97-AF65-F5344CB8AC3E}">
+        <p14:creationId xmlns:p14="http://schemas.microsoft.com/office/powerpoint/2010/main" val="863530338"/>
       </p:ext>
     </p:extLst>
   </p:cSld>

</xml_diff>

<commit_message>
added keyboard nav demo
</commit_message>
<xml_diff>
--- a/images/navigation.pptx
+++ b/images/navigation.pptx
@@ -261,7 +261,7 @@
           <a:p>
             <a:fld id="{92CAF144-618B-1A4E-9F2D-D69615B5794B}" type="datetimeFigureOut">
               <a:rPr lang="en-US" smtClean="0"/>
-              <a:t>6/16/21</a:t>
+              <a:t>6/17/21</a:t>
             </a:fld>
             <a:endParaRPr lang="en-US"/>
           </a:p>
@@ -459,7 +459,7 @@
           <a:p>
             <a:fld id="{92CAF144-618B-1A4E-9F2D-D69615B5794B}" type="datetimeFigureOut">
               <a:rPr lang="en-US" smtClean="0"/>
-              <a:t>6/16/21</a:t>
+              <a:t>6/17/21</a:t>
             </a:fld>
             <a:endParaRPr lang="en-US"/>
           </a:p>
@@ -667,7 +667,7 @@
           <a:p>
             <a:fld id="{92CAF144-618B-1A4E-9F2D-D69615B5794B}" type="datetimeFigureOut">
               <a:rPr lang="en-US" smtClean="0"/>
-              <a:t>6/16/21</a:t>
+              <a:t>6/17/21</a:t>
             </a:fld>
             <a:endParaRPr lang="en-US"/>
           </a:p>
@@ -865,7 +865,7 @@
           <a:p>
             <a:fld id="{92CAF144-618B-1A4E-9F2D-D69615B5794B}" type="datetimeFigureOut">
               <a:rPr lang="en-US" smtClean="0"/>
-              <a:t>6/16/21</a:t>
+              <a:t>6/17/21</a:t>
             </a:fld>
             <a:endParaRPr lang="en-US"/>
           </a:p>
@@ -1140,7 +1140,7 @@
           <a:p>
             <a:fld id="{92CAF144-618B-1A4E-9F2D-D69615B5794B}" type="datetimeFigureOut">
               <a:rPr lang="en-US" smtClean="0"/>
-              <a:t>6/16/21</a:t>
+              <a:t>6/17/21</a:t>
             </a:fld>
             <a:endParaRPr lang="en-US"/>
           </a:p>
@@ -1405,7 +1405,7 @@
           <a:p>
             <a:fld id="{92CAF144-618B-1A4E-9F2D-D69615B5794B}" type="datetimeFigureOut">
               <a:rPr lang="en-US" smtClean="0"/>
-              <a:t>6/16/21</a:t>
+              <a:t>6/17/21</a:t>
             </a:fld>
             <a:endParaRPr lang="en-US"/>
           </a:p>
@@ -1817,7 +1817,7 @@
           <a:p>
             <a:fld id="{92CAF144-618B-1A4E-9F2D-D69615B5794B}" type="datetimeFigureOut">
               <a:rPr lang="en-US" smtClean="0"/>
-              <a:t>6/16/21</a:t>
+              <a:t>6/17/21</a:t>
             </a:fld>
             <a:endParaRPr lang="en-US"/>
           </a:p>
@@ -1958,7 +1958,7 @@
           <a:p>
             <a:fld id="{92CAF144-618B-1A4E-9F2D-D69615B5794B}" type="datetimeFigureOut">
               <a:rPr lang="en-US" smtClean="0"/>
-              <a:t>6/16/21</a:t>
+              <a:t>6/17/21</a:t>
             </a:fld>
             <a:endParaRPr lang="en-US"/>
           </a:p>
@@ -2071,7 +2071,7 @@
           <a:p>
             <a:fld id="{92CAF144-618B-1A4E-9F2D-D69615B5794B}" type="datetimeFigureOut">
               <a:rPr lang="en-US" smtClean="0"/>
-              <a:t>6/16/21</a:t>
+              <a:t>6/17/21</a:t>
             </a:fld>
             <a:endParaRPr lang="en-US"/>
           </a:p>
@@ -2382,7 +2382,7 @@
           <a:p>
             <a:fld id="{92CAF144-618B-1A4E-9F2D-D69615B5794B}" type="datetimeFigureOut">
               <a:rPr lang="en-US" smtClean="0"/>
-              <a:t>6/16/21</a:t>
+              <a:t>6/17/21</a:t>
             </a:fld>
             <a:endParaRPr lang="en-US"/>
           </a:p>
@@ -2670,7 +2670,7 @@
           <a:p>
             <a:fld id="{92CAF144-618B-1A4E-9F2D-D69615B5794B}" type="datetimeFigureOut">
               <a:rPr lang="en-US" smtClean="0"/>
-              <a:t>6/16/21</a:t>
+              <a:t>6/17/21</a:t>
             </a:fld>
             <a:endParaRPr lang="en-US"/>
           </a:p>
@@ -2911,7 +2911,7 @@
           <a:p>
             <a:fld id="{92CAF144-618B-1A4E-9F2D-D69615B5794B}" type="datetimeFigureOut">
               <a:rPr lang="en-US" smtClean="0"/>
-              <a:t>6/16/21</a:t>
+              <a:t>6/17/21</a:t>
             </a:fld>
             <a:endParaRPr lang="en-US"/>
           </a:p>
@@ -4247,7 +4247,198 @@
         <p:spPr>
           <a:xfrm rot="10800000">
             <a:off x="3682606" y="2169160"/>
-            <a:ext cx="335754" cy="1153598"/>
+            <a:ext cx="335754" cy="1259840"/>
+          </a:xfrm>
+          <a:prstGeom prst="upArrow">
+            <a:avLst>
+              <a:gd name="adj1" fmla="val 18539"/>
+              <a:gd name="adj2" fmla="val 60113"/>
+            </a:avLst>
+          </a:prstGeom>
+          <a:solidFill>
+            <a:srgbClr val="51EA00"/>
+          </a:solidFill>
+          <a:ln>
+            <a:noFill/>
+          </a:ln>
+        </p:spPr>
+        <p:style>
+          <a:lnRef idx="2">
+            <a:schemeClr val="accent1">
+              <a:shade val="50000"/>
+            </a:schemeClr>
+          </a:lnRef>
+          <a:fillRef idx="1">
+            <a:schemeClr val="accent1"/>
+          </a:fillRef>
+          <a:effectRef idx="0">
+            <a:schemeClr val="accent1"/>
+          </a:effectRef>
+          <a:fontRef idx="minor">
+            <a:schemeClr val="lt1"/>
+          </a:fontRef>
+        </p:style>
+        <p:txBody>
+          <a:bodyPr rtlCol="0" anchor="ctr"/>
+          <a:lstStyle/>
+          <a:p>
+            <a:pPr algn="ctr"/>
+            <a:endParaRPr lang="en-US"/>
+          </a:p>
+        </p:txBody>
+      </p:sp>
+      <p:sp>
+        <p:nvSpPr>
+          <p:cNvPr id="25" name="TextBox 24">
+            <a:extLst>
+              <a:ext uri="{FF2B5EF4-FFF2-40B4-BE49-F238E27FC236}">
+                <a16:creationId xmlns:a16="http://schemas.microsoft.com/office/drawing/2014/main" id="{F3661B38-9F59-E34A-8F8B-0F38B023DF8F}"/>
+              </a:ext>
+            </a:extLst>
+          </p:cNvPr>
+          <p:cNvSpPr txBox="1"/>
+          <p:nvPr/>
+        </p:nvSpPr>
+        <p:spPr>
+          <a:xfrm>
+            <a:off x="4783274" y="3798684"/>
+            <a:ext cx="343230" cy="276999"/>
+          </a:xfrm>
+          <a:prstGeom prst="rect">
+            <a:avLst/>
+          </a:prstGeom>
+          <a:solidFill>
+            <a:schemeClr val="tx1"/>
+          </a:solidFill>
+        </p:spPr>
+        <p:txBody>
+          <a:bodyPr wrap="square" lIns="0" tIns="0" rIns="0" bIns="0" rtlCol="0">
+            <a:spAutoFit/>
+          </a:bodyPr>
+          <a:lstStyle/>
+          <a:p>
+            <a:r>
+              <a:rPr lang="en-US" dirty="0">
+                <a:solidFill>
+                  <a:srgbClr val="51EA00"/>
+                </a:solidFill>
+              </a:rPr>
+              <a:t>⌫</a:t>
+            </a:r>
+            <a:endParaRPr lang="en-US" sz="1400" b="1" dirty="0">
+              <a:solidFill>
+                <a:srgbClr val="51EA00"/>
+              </a:solidFill>
+              <a:latin typeface="Arial" panose="020B0604020202020204" pitchFamily="34" charset="0"/>
+              <a:cs typeface="Arial" panose="020B0604020202020204" pitchFamily="34" charset="0"/>
+            </a:endParaRPr>
+          </a:p>
+        </p:txBody>
+      </p:sp>
+      <p:sp>
+        <p:nvSpPr>
+          <p:cNvPr id="26" name="TextBox 25">
+            <a:extLst>
+              <a:ext uri="{FF2B5EF4-FFF2-40B4-BE49-F238E27FC236}">
+                <a16:creationId xmlns:a16="http://schemas.microsoft.com/office/drawing/2014/main" id="{49CF0EC2-D9B9-964C-A575-C3ED7EA5B7CD}"/>
+              </a:ext>
+            </a:extLst>
+          </p:cNvPr>
+          <p:cNvSpPr txBox="1"/>
+          <p:nvPr/>
+        </p:nvSpPr>
+        <p:spPr>
+          <a:xfrm>
+            <a:off x="4653680" y="3484435"/>
+            <a:ext cx="343230" cy="276999"/>
+          </a:xfrm>
+          <a:prstGeom prst="rect">
+            <a:avLst/>
+          </a:prstGeom>
+          <a:solidFill>
+            <a:schemeClr val="tx1"/>
+          </a:solidFill>
+        </p:spPr>
+        <p:txBody>
+          <a:bodyPr wrap="square" lIns="0" tIns="0" rIns="0" bIns="0" rtlCol="0">
+            <a:spAutoFit/>
+          </a:bodyPr>
+          <a:lstStyle/>
+          <a:p>
+            <a:r>
+              <a:rPr lang="en-US" b="1" dirty="0">
+                <a:solidFill>
+                  <a:srgbClr val="51EA00"/>
+                </a:solidFill>
+              </a:rPr>
+              <a:t>⌦</a:t>
+            </a:r>
+            <a:endParaRPr lang="en-US" sz="1400" b="1" dirty="0">
+              <a:solidFill>
+                <a:srgbClr val="51EA00"/>
+              </a:solidFill>
+              <a:latin typeface="Arial" panose="020B0604020202020204" pitchFamily="34" charset="0"/>
+              <a:cs typeface="Arial" panose="020B0604020202020204" pitchFamily="34" charset="0"/>
+            </a:endParaRPr>
+          </a:p>
+        </p:txBody>
+      </p:sp>
+      <p:sp>
+        <p:nvSpPr>
+          <p:cNvPr id="27" name="TextBox 26">
+            <a:extLst>
+              <a:ext uri="{FF2B5EF4-FFF2-40B4-BE49-F238E27FC236}">
+                <a16:creationId xmlns:a16="http://schemas.microsoft.com/office/drawing/2014/main" id="{7FE77B3E-9BA4-974D-974D-0A73ACCEC60D}"/>
+              </a:ext>
+            </a:extLst>
+          </p:cNvPr>
+          <p:cNvSpPr txBox="1"/>
+          <p:nvPr/>
+        </p:nvSpPr>
+        <p:spPr>
+          <a:xfrm>
+            <a:off x="3550823" y="4842115"/>
+            <a:ext cx="2534668" cy="369332"/>
+          </a:xfrm>
+          <a:prstGeom prst="rect">
+            <a:avLst/>
+          </a:prstGeom>
+          <a:noFill/>
+        </p:spPr>
+        <p:txBody>
+          <a:bodyPr wrap="none" rtlCol="0">
+            <a:spAutoFit/>
+          </a:bodyPr>
+          <a:lstStyle/>
+          <a:p>
+            <a:r>
+              <a:rPr lang="en-US" b="1" dirty="0">
+                <a:solidFill>
+                  <a:srgbClr val="51EA00"/>
+                </a:solidFill>
+                <a:latin typeface="Fira Sans" panose="020B0503050000020004" pitchFamily="34" charset="0"/>
+              </a:rPr>
+              <a:t>Forward / Back Delete</a:t>
+            </a:r>
+          </a:p>
+        </p:txBody>
+      </p:sp>
+      <p:sp>
+        <p:nvSpPr>
+          <p:cNvPr id="28" name="Up Arrow 27">
+            <a:extLst>
+              <a:ext uri="{FF2B5EF4-FFF2-40B4-BE49-F238E27FC236}">
+                <a16:creationId xmlns:a16="http://schemas.microsoft.com/office/drawing/2014/main" id="{EBCD50D8-5AA9-9240-A69D-6FA0159D8F34}"/>
+              </a:ext>
+            </a:extLst>
+          </p:cNvPr>
+          <p:cNvSpPr/>
+          <p:nvPr/>
+        </p:nvSpPr>
+        <p:spPr>
+          <a:xfrm>
+            <a:off x="4653680" y="4119693"/>
+            <a:ext cx="335754" cy="688922"/>
           </a:xfrm>
           <a:prstGeom prst="upArrow">
             <a:avLst>

</xml_diff>